<commit_message>
Update presentation and minor changes
</commit_message>
<xml_diff>
--- a/Presentation.pptx
+++ b/Presentation.pptx
@@ -206,7 +206,7 @@
           <a:p>
             <a:fld id="{93116997-B494-44C9-84C9-A93C3C2CEC24}" type="datetimeFigureOut">
               <a:rPr lang="pt-PT" smtClean="0"/>
-              <a:t>19/04/2023</a:t>
+              <a:t>20/04/2023</a:t>
             </a:fld>
             <a:endParaRPr lang="pt-PT"/>
           </a:p>
@@ -659,7 +659,7 @@
           <a:p>
             <a:fld id="{0BAE8B48-FDC3-4928-819C-DDEA46DB59BA}" type="datetime1">
               <a:rPr lang="pt-PT" smtClean="0"/>
-              <a:t>19/04/2023</a:t>
+              <a:t>20/04/2023</a:t>
             </a:fld>
             <a:endParaRPr lang="pt-PT"/>
           </a:p>
@@ -934,7 +934,7 @@
           <a:p>
             <a:fld id="{5A910265-E694-4AB3-9828-C1839AEC0015}" type="datetime1">
               <a:rPr lang="pt-PT" smtClean="0"/>
-              <a:t>19/04/2023</a:t>
+              <a:t>20/04/2023</a:t>
             </a:fld>
             <a:endParaRPr lang="pt-PT"/>
           </a:p>
@@ -1128,7 +1128,7 @@
           <a:p>
             <a:fld id="{9AF3D6E4-7C9C-4917-8A3C-631761BAF8E6}" type="datetime1">
               <a:rPr lang="pt-PT" smtClean="0"/>
-              <a:t>19/04/2023</a:t>
+              <a:t>20/04/2023</a:t>
             </a:fld>
             <a:endParaRPr lang="pt-PT"/>
           </a:p>
@@ -1401,7 +1401,7 @@
           <a:p>
             <a:fld id="{FBA4AE9B-F31E-4DD0-AA6C-682BF21BAF4E}" type="datetime1">
               <a:rPr lang="pt-PT" smtClean="0"/>
-              <a:t>19/04/2023</a:t>
+              <a:t>20/04/2023</a:t>
             </a:fld>
             <a:endParaRPr lang="pt-PT"/>
           </a:p>
@@ -1742,7 +1742,7 @@
           <a:p>
             <a:fld id="{6573EA34-5558-43E1-8B2F-5B260EDD09AA}" type="datetime1">
               <a:rPr lang="pt-PT" smtClean="0"/>
-              <a:t>19/04/2023</a:t>
+              <a:t>20/04/2023</a:t>
             </a:fld>
             <a:endParaRPr lang="pt-PT"/>
           </a:p>
@@ -2365,7 +2365,7 @@
           <a:p>
             <a:fld id="{D08C1543-BBB6-4E09-B97C-15090F5AA06C}" type="datetime1">
               <a:rPr lang="pt-PT" smtClean="0"/>
-              <a:t>19/04/2023</a:t>
+              <a:t>20/04/2023</a:t>
             </a:fld>
             <a:endParaRPr lang="pt-PT"/>
           </a:p>
@@ -3225,7 +3225,7 @@
           <a:p>
             <a:fld id="{FAE86541-368B-4D74-B9E2-F67694FCD098}" type="datetime1">
               <a:rPr lang="pt-PT" smtClean="0"/>
-              <a:t>19/04/2023</a:t>
+              <a:t>20/04/2023</a:t>
             </a:fld>
             <a:endParaRPr lang="pt-PT"/>
           </a:p>
@@ -3395,7 +3395,7 @@
           <a:p>
             <a:fld id="{411DB217-1185-4676-AE6F-DC23BABDDD71}" type="datetime1">
               <a:rPr lang="pt-PT" smtClean="0"/>
-              <a:t>19/04/2023</a:t>
+              <a:t>20/04/2023</a:t>
             </a:fld>
             <a:endParaRPr lang="pt-PT"/>
           </a:p>
@@ -3575,7 +3575,7 @@
           <a:p>
             <a:fld id="{3A407097-F742-42CB-A521-E53185A4A3E7}" type="datetime1">
               <a:rPr lang="pt-PT" smtClean="0"/>
-              <a:t>19/04/2023</a:t>
+              <a:t>20/04/2023</a:t>
             </a:fld>
             <a:endParaRPr lang="pt-PT"/>
           </a:p>
@@ -3745,7 +3745,7 @@
           <a:p>
             <a:fld id="{DCE8B177-FF3A-44E6-9048-77AD3355A69E}" type="datetime1">
               <a:rPr lang="pt-PT" smtClean="0"/>
-              <a:t>19/04/2023</a:t>
+              <a:t>20/04/2023</a:t>
             </a:fld>
             <a:endParaRPr lang="pt-PT"/>
           </a:p>
@@ -3992,7 +3992,7 @@
           <a:p>
             <a:fld id="{1E3618C0-E797-4FD0-BBB2-730ED5B5B894}" type="datetime1">
               <a:rPr lang="pt-PT" smtClean="0"/>
-              <a:t>19/04/2023</a:t>
+              <a:t>20/04/2023</a:t>
             </a:fld>
             <a:endParaRPr lang="pt-PT"/>
           </a:p>
@@ -4284,7 +4284,7 @@
           <a:p>
             <a:fld id="{7D02E406-6472-419E-8A62-D51311DD86E6}" type="datetime1">
               <a:rPr lang="pt-PT" smtClean="0"/>
-              <a:t>19/04/2023</a:t>
+              <a:t>20/04/2023</a:t>
             </a:fld>
             <a:endParaRPr lang="pt-PT"/>
           </a:p>
@@ -4728,7 +4728,7 @@
           <a:p>
             <a:fld id="{2BFE6238-BA7F-417D-B1E6-1B474B773E43}" type="datetime1">
               <a:rPr lang="pt-PT" smtClean="0"/>
-              <a:t>19/04/2023</a:t>
+              <a:t>20/04/2023</a:t>
             </a:fld>
             <a:endParaRPr lang="pt-PT"/>
           </a:p>
@@ -4846,7 +4846,7 @@
           <a:p>
             <a:fld id="{CF629CA1-924C-4468-8427-ADFE9F310216}" type="datetime1">
               <a:rPr lang="pt-PT" smtClean="0"/>
-              <a:t>19/04/2023</a:t>
+              <a:t>20/04/2023</a:t>
             </a:fld>
             <a:endParaRPr lang="pt-PT"/>
           </a:p>
@@ -4941,7 +4941,7 @@
           <a:p>
             <a:fld id="{ADCB8AFD-44FD-47E7-AA07-6FFFAEBD9708}" type="datetime1">
               <a:rPr lang="pt-PT" smtClean="0"/>
-              <a:t>19/04/2023</a:t>
+              <a:t>20/04/2023</a:t>
             </a:fld>
             <a:endParaRPr lang="pt-PT"/>
           </a:p>
@@ -5220,7 +5220,7 @@
           <a:p>
             <a:fld id="{ED5D2E7C-59C6-4785-A2B6-06C181A869E2}" type="datetime1">
               <a:rPr lang="pt-PT" smtClean="0"/>
-              <a:t>19/04/2023</a:t>
+              <a:t>20/04/2023</a:t>
             </a:fld>
             <a:endParaRPr lang="pt-PT"/>
           </a:p>
@@ -5495,7 +5495,7 @@
           <a:p>
             <a:fld id="{EA7CA550-DE86-4AD0-B20A-36D5C2FCF633}" type="datetime1">
               <a:rPr lang="pt-PT" smtClean="0"/>
-              <a:t>19/04/2023</a:t>
+              <a:t>20/04/2023</a:t>
             </a:fld>
             <a:endParaRPr lang="pt-PT"/>
           </a:p>
@@ -5924,7 +5924,7 @@
           <a:p>
             <a:fld id="{7B5E84FC-DAA9-4D5C-8D5E-563C3AB2AFDB}" type="datetime1">
               <a:rPr lang="pt-PT" smtClean="0"/>
-              <a:t>19/04/2023</a:t>
+              <a:t>20/04/2023</a:t>
             </a:fld>
             <a:endParaRPr lang="pt-PT"/>
           </a:p>
@@ -6484,7 +6484,7 @@
                 <a:latin typeface="Times New Roman" panose="02020603050405020304" pitchFamily="18" charset="0"/>
                 <a:cs typeface="Times New Roman" panose="02020603050405020304" pitchFamily="18" charset="0"/>
               </a:rPr>
-              <a:t>Natural Language Processing</a:t>
+              <a:t>Natural Language Processing – TP1</a:t>
             </a:r>
           </a:p>
         </p:txBody>
@@ -6767,7 +6767,7 @@
                 <a:latin typeface="Times New Roman" panose="02020603050405020304" pitchFamily="18" charset="0"/>
                 <a:cs typeface="Times New Roman" panose="02020603050405020304" pitchFamily="18" charset="0"/>
               </a:rPr>
-              <a:t>Natural Language Processing</a:t>
+              <a:t>Natural Language Processing – TP1</a:t>
             </a:r>
           </a:p>
         </p:txBody>
@@ -6992,7 +6992,7 @@
     </p:spTree>
     <p:extLst>
       <p:ext uri="{BB962C8B-B14F-4D97-AF65-F5344CB8AC3E}">
-        <p14:creationId xmlns:p14="http://schemas.microsoft.com/office/powerpoint/2010/main" val="290352747"/>
+        <p14:creationId xmlns:p14="http://schemas.microsoft.com/office/powerpoint/2010/main" val="1801497512"/>
       </p:ext>
     </p:extLst>
   </p:cSld>
@@ -12277,6 +12277,58 @@
           </a:prstGeom>
         </p:spPr>
       </p:pic>
+      <p:sp>
+        <p:nvSpPr>
+          <p:cNvPr id="6" name="Retângulo 5">
+            <a:extLst>
+              <a:ext uri="{FF2B5EF4-FFF2-40B4-BE49-F238E27FC236}">
+                <a16:creationId xmlns:a16="http://schemas.microsoft.com/office/drawing/2014/main" id="{2A1EC3E9-0A60-0028-0673-EDA08544ECE3}"/>
+              </a:ext>
+            </a:extLst>
+          </p:cNvPr>
+          <p:cNvSpPr/>
+          <p:nvPr/>
+        </p:nvSpPr>
+        <p:spPr>
+          <a:xfrm>
+            <a:off x="2279705" y="671735"/>
+            <a:ext cx="3030737" cy="2976177"/>
+          </a:xfrm>
+          <a:prstGeom prst="rect">
+            <a:avLst/>
+          </a:prstGeom>
+          <a:noFill/>
+          <a:ln>
+            <a:solidFill>
+              <a:srgbClr val="00B050"/>
+            </a:solidFill>
+          </a:ln>
+        </p:spPr>
+        <p:style>
+          <a:lnRef idx="2">
+            <a:schemeClr val="accent1">
+              <a:shade val="50000"/>
+            </a:schemeClr>
+          </a:lnRef>
+          <a:fillRef idx="1">
+            <a:schemeClr val="accent1"/>
+          </a:fillRef>
+          <a:effectRef idx="0">
+            <a:schemeClr val="accent1"/>
+          </a:effectRef>
+          <a:fontRef idx="minor">
+            <a:schemeClr val="lt1"/>
+          </a:fontRef>
+        </p:style>
+        <p:txBody>
+          <a:bodyPr rtlCol="0" anchor="ctr"/>
+          <a:lstStyle/>
+          <a:p>
+            <a:pPr algn="ctr"/>
+            <a:endParaRPr lang="pt-PT" sz="2400"/>
+          </a:p>
+        </p:txBody>
+      </p:sp>
       <p:pic>
         <p:nvPicPr>
           <p:cNvPr id="13" name="Imagem 12">
@@ -12306,6 +12358,58 @@
           </a:prstGeom>
         </p:spPr>
       </p:pic>
+      <p:sp>
+        <p:nvSpPr>
+          <p:cNvPr id="3" name="Retângulo 2">
+            <a:extLst>
+              <a:ext uri="{FF2B5EF4-FFF2-40B4-BE49-F238E27FC236}">
+                <a16:creationId xmlns:a16="http://schemas.microsoft.com/office/drawing/2014/main" id="{B1334A97-943A-067E-DB61-54AE059285F1}"/>
+              </a:ext>
+            </a:extLst>
+          </p:cNvPr>
+          <p:cNvSpPr/>
+          <p:nvPr/>
+        </p:nvSpPr>
+        <p:spPr>
+          <a:xfrm>
+            <a:off x="131918" y="4211273"/>
+            <a:ext cx="7328108" cy="2215774"/>
+          </a:xfrm>
+          <a:prstGeom prst="rect">
+            <a:avLst/>
+          </a:prstGeom>
+          <a:noFill/>
+          <a:ln>
+            <a:solidFill>
+              <a:srgbClr val="00B050"/>
+            </a:solidFill>
+          </a:ln>
+        </p:spPr>
+        <p:style>
+          <a:lnRef idx="2">
+            <a:schemeClr val="accent1">
+              <a:shade val="50000"/>
+            </a:schemeClr>
+          </a:lnRef>
+          <a:fillRef idx="1">
+            <a:schemeClr val="accent1"/>
+          </a:fillRef>
+          <a:effectRef idx="0">
+            <a:schemeClr val="accent1"/>
+          </a:effectRef>
+          <a:fontRef idx="minor">
+            <a:schemeClr val="lt1"/>
+          </a:fontRef>
+        </p:style>
+        <p:txBody>
+          <a:bodyPr rtlCol="0" anchor="ctr"/>
+          <a:lstStyle/>
+          <a:p>
+            <a:pPr algn="ctr"/>
+            <a:endParaRPr lang="pt-PT" sz="2400"/>
+          </a:p>
+        </p:txBody>
+      </p:sp>
       <p:sp>
         <p:nvSpPr>
           <p:cNvPr id="17" name="Retângulo 16">
@@ -12741,8 +12845,8 @@
         </p:nvSpPr>
         <p:spPr>
           <a:xfrm>
-            <a:off x="2272153" y="695103"/>
-            <a:ext cx="487825" cy="368313"/>
+            <a:off x="2306637" y="695103"/>
+            <a:ext cx="453341" cy="368313"/>
           </a:xfrm>
           <a:prstGeom prst="rect">
             <a:avLst/>
@@ -13221,6 +13325,82 @@
           <a:p>
             <a:pPr algn="ctr"/>
             <a:endParaRPr lang="pt-PT"/>
+          </a:p>
+        </p:txBody>
+      </p:sp>
+      <p:sp>
+        <p:nvSpPr>
+          <p:cNvPr id="5" name="CaixaDeTexto 4">
+            <a:extLst>
+              <a:ext uri="{FF2B5EF4-FFF2-40B4-BE49-F238E27FC236}">
+                <a16:creationId xmlns:a16="http://schemas.microsoft.com/office/drawing/2014/main" id="{F8C3069F-3CA8-448B-5926-E45C3FBE0685}"/>
+              </a:ext>
+            </a:extLst>
+          </p:cNvPr>
+          <p:cNvSpPr txBox="1"/>
+          <p:nvPr/>
+        </p:nvSpPr>
+        <p:spPr>
+          <a:xfrm>
+            <a:off x="2306637" y="233344"/>
+            <a:ext cx="607860" cy="369332"/>
+          </a:xfrm>
+          <a:prstGeom prst="rect">
+            <a:avLst/>
+          </a:prstGeom>
+          <a:noFill/>
+        </p:spPr>
+        <p:txBody>
+          <a:bodyPr wrap="none" rtlCol="0">
+            <a:spAutoFit/>
+          </a:bodyPr>
+          <a:lstStyle/>
+          <a:p>
+            <a:pPr algn="ctr"/>
+            <a:r>
+              <a:rPr lang="en-GB" dirty="0">
+                <a:latin typeface="+mj-lt"/>
+              </a:rPr>
+              <a:t>PDF</a:t>
+            </a:r>
+          </a:p>
+        </p:txBody>
+      </p:sp>
+      <p:sp>
+        <p:nvSpPr>
+          <p:cNvPr id="7" name="CaixaDeTexto 6">
+            <a:extLst>
+              <a:ext uri="{FF2B5EF4-FFF2-40B4-BE49-F238E27FC236}">
+                <a16:creationId xmlns:a16="http://schemas.microsoft.com/office/drawing/2014/main" id="{70901B63-30D8-4057-7F06-3E6F9FF8ACF2}"/>
+              </a:ext>
+            </a:extLst>
+          </p:cNvPr>
+          <p:cNvSpPr txBox="1"/>
+          <p:nvPr/>
+        </p:nvSpPr>
+        <p:spPr>
+          <a:xfrm>
+            <a:off x="166023" y="3786294"/>
+            <a:ext cx="697627" cy="369332"/>
+          </a:xfrm>
+          <a:prstGeom prst="rect">
+            <a:avLst/>
+          </a:prstGeom>
+          <a:noFill/>
+        </p:spPr>
+        <p:txBody>
+          <a:bodyPr wrap="none" rtlCol="0">
+            <a:spAutoFit/>
+          </a:bodyPr>
+          <a:lstStyle/>
+          <a:p>
+            <a:pPr algn="ctr"/>
+            <a:r>
+              <a:rPr lang="en-GB" dirty="0">
+                <a:latin typeface="+mj-lt"/>
+              </a:rPr>
+              <a:t>XML</a:t>
+            </a:r>
           </a:p>
         </p:txBody>
       </p:sp>

</xml_diff>